<commit_message>
PP Last minute correction
</commit_message>
<xml_diff>
--- a/PP/PresentationDD.pptx
+++ b/PP/PresentationDD.pptx
@@ -5,7 +5,7 @@
     <p:sldMasterId id="2147483648" r:id="rId1"/>
   </p:sldMasterIdLst>
   <p:notesMasterIdLst>
-    <p:notesMasterId r:id="rId16"/>
+    <p:notesMasterId r:id="rId20"/>
   </p:notesMasterIdLst>
   <p:sldIdLst>
     <p:sldId id="256" r:id="rId2"/>
@@ -22,6 +22,10 @@
     <p:sldId id="268" r:id="rId13"/>
     <p:sldId id="269" r:id="rId14"/>
     <p:sldId id="271" r:id="rId15"/>
+    <p:sldId id="272" r:id="rId16"/>
+    <p:sldId id="273" r:id="rId17"/>
+    <p:sldId id="274" r:id="rId18"/>
+    <p:sldId id="275" r:id="rId19"/>
   </p:sldIdLst>
   <p:sldSz cx="9144000" cy="6858000" type="screen4x3"/>
   <p:notesSz cx="6858000" cy="9144000"/>
@@ -31680,10 +31684,2202 @@
           </a:prstGeom>
         </p:spPr>
       </p:pic>
+      <p:sp>
+        <p:nvSpPr>
+          <p:cNvPr id="3" name="TextBox 2"/>
+          <p:cNvSpPr txBox="1"/>
+          <p:nvPr/>
+        </p:nvSpPr>
+        <p:spPr>
+          <a:xfrm>
+            <a:off x="685800" y="1210122"/>
+            <a:ext cx="7772400" cy="5678477"/>
+          </a:xfrm>
+          <a:prstGeom prst="rect">
+            <a:avLst/>
+          </a:prstGeom>
+          <a:noFill/>
+        </p:spPr>
+        <p:txBody>
+          <a:bodyPr wrap="square" rtlCol="0">
+            <a:spAutoFit/>
+          </a:bodyPr>
+          <a:lstStyle/>
+          <a:p>
+            <a:pPr algn="ctr"/>
+            <a:r>
+              <a:rPr lang="en-US" sz="2200" b="1" u="sng" dirty="0" smtClean="0">
+                <a:solidFill>
+                  <a:srgbClr val="FF6600"/>
+                </a:solidFill>
+              </a:rPr>
+              <a:t>Car Search Algorithm</a:t>
+            </a:r>
+          </a:p>
+          <a:p>
+            <a:pPr algn="ctr"/>
+            <a:endParaRPr lang="en-US" sz="2200" b="1" u="sng" dirty="0" smtClean="0">
+              <a:solidFill>
+                <a:srgbClr val="595959"/>
+              </a:solidFill>
+            </a:endParaRPr>
+          </a:p>
+          <a:p>
+            <a:pPr marL="342900" indent="-342900">
+              <a:buFont typeface="Arial"/>
+              <a:buChar char="•"/>
+            </a:pPr>
+            <a:r>
+              <a:rPr lang="en-US" sz="2200" dirty="0" smtClean="0">
+                <a:solidFill>
+                  <a:srgbClr val="595959"/>
+                </a:solidFill>
+              </a:rPr>
+              <a:t>User sends </a:t>
+            </a:r>
+            <a:r>
+              <a:rPr lang="en-US" sz="2200" b="1" dirty="0" smtClean="0">
+                <a:solidFill>
+                  <a:srgbClr val="595959"/>
+                </a:solidFill>
+              </a:rPr>
+              <a:t>Search Action </a:t>
+            </a:r>
+            <a:r>
+              <a:rPr lang="en-US" sz="2200" dirty="0" smtClean="0">
+                <a:solidFill>
+                  <a:srgbClr val="595959"/>
+                </a:solidFill>
+              </a:rPr>
+              <a:t>with relative </a:t>
+            </a:r>
+            <a:r>
+              <a:rPr lang="en-US" sz="2200" b="1" dirty="0" smtClean="0">
+                <a:solidFill>
+                  <a:srgbClr val="595959"/>
+                </a:solidFill>
+              </a:rPr>
+              <a:t>SearchData </a:t>
+            </a:r>
+            <a:r>
+              <a:rPr lang="en-US" sz="2200" dirty="0" smtClean="0">
+                <a:solidFill>
+                  <a:srgbClr val="595959"/>
+                </a:solidFill>
+              </a:rPr>
+              <a:t>to the Back-End application via </a:t>
+            </a:r>
+            <a:r>
+              <a:rPr lang="en-US" sz="2200" b="1" dirty="0" smtClean="0">
+                <a:solidFill>
+                  <a:srgbClr val="595959"/>
+                </a:solidFill>
+              </a:rPr>
+              <a:t>HTTPS</a:t>
+            </a:r>
+            <a:r>
+              <a:rPr lang="en-US" sz="2200" dirty="0" smtClean="0">
+                <a:solidFill>
+                  <a:srgbClr val="595959"/>
+                </a:solidFill>
+              </a:rPr>
+              <a:t>. As shown , the request is </a:t>
+            </a:r>
+            <a:r>
+              <a:rPr lang="en-US" sz="2200" b="1" dirty="0" smtClean="0">
+                <a:solidFill>
+                  <a:srgbClr val="595959"/>
+                </a:solidFill>
+              </a:rPr>
+              <a:t>encapsulated</a:t>
+            </a:r>
+            <a:r>
+              <a:rPr lang="en-US" sz="2200" dirty="0" smtClean="0">
+                <a:solidFill>
+                  <a:srgbClr val="595959"/>
+                </a:solidFill>
+              </a:rPr>
+              <a:t> and then </a:t>
+            </a:r>
+            <a:r>
+              <a:rPr lang="en-US" sz="2200" b="1" dirty="0" smtClean="0">
+                <a:solidFill>
+                  <a:srgbClr val="595959"/>
+                </a:solidFill>
+              </a:rPr>
+              <a:t>dispatched server side</a:t>
+            </a:r>
+            <a:r>
+              <a:rPr lang="en-US" sz="2200" dirty="0" smtClean="0">
+                <a:solidFill>
+                  <a:srgbClr val="595959"/>
+                </a:solidFill>
+              </a:rPr>
+              <a:t>.</a:t>
+            </a:r>
+          </a:p>
+          <a:p>
+            <a:pPr marL="342900" indent="-342900">
+              <a:lnSpc>
+                <a:spcPct val="50000"/>
+              </a:lnSpc>
+              <a:buFont typeface="Arial"/>
+              <a:buChar char="•"/>
+            </a:pPr>
+            <a:endParaRPr lang="en-US" sz="2200" dirty="0" smtClean="0">
+              <a:solidFill>
+                <a:srgbClr val="595959"/>
+              </a:solidFill>
+            </a:endParaRPr>
+          </a:p>
+          <a:p>
+            <a:pPr marL="342900" indent="-342900">
+              <a:buFont typeface="Arial"/>
+              <a:buChar char="•"/>
+            </a:pPr>
+            <a:r>
+              <a:rPr lang="en-US" sz="2200" dirty="0" smtClean="0">
+                <a:solidFill>
+                  <a:srgbClr val="595959"/>
+                </a:solidFill>
+              </a:rPr>
+              <a:t>The Back-End application’s </a:t>
+            </a:r>
+            <a:r>
+              <a:rPr lang="en-US" sz="2200" b="1" dirty="0" smtClean="0">
+                <a:solidFill>
+                  <a:srgbClr val="595959"/>
+                </a:solidFill>
+              </a:rPr>
+              <a:t>RequestManager </a:t>
+            </a:r>
+            <a:r>
+              <a:rPr lang="en-US" sz="2200" dirty="0" smtClean="0">
+                <a:solidFill>
+                  <a:srgbClr val="595959"/>
+                </a:solidFill>
+              </a:rPr>
+              <a:t>forwards the request to the </a:t>
+            </a:r>
+            <a:r>
+              <a:rPr lang="en-US" sz="2200" b="1" dirty="0" smtClean="0">
+                <a:solidFill>
+                  <a:srgbClr val="595959"/>
+                </a:solidFill>
+              </a:rPr>
+              <a:t>SearchManager </a:t>
+            </a:r>
+            <a:r>
+              <a:rPr lang="en-US" sz="2200" dirty="0" smtClean="0">
+                <a:solidFill>
+                  <a:srgbClr val="595959"/>
+                </a:solidFill>
+              </a:rPr>
+              <a:t>that retrieves relevant data </a:t>
+            </a:r>
+            <a:r>
+              <a:rPr lang="en-US" sz="2200" b="1" dirty="0" smtClean="0">
+                <a:solidFill>
+                  <a:srgbClr val="595959"/>
+                </a:solidFill>
+              </a:rPr>
+              <a:t>according</a:t>
+            </a:r>
+            <a:r>
+              <a:rPr lang="en-US" sz="2200" dirty="0" smtClean="0">
+                <a:solidFill>
+                  <a:srgbClr val="595959"/>
+                </a:solidFill>
+              </a:rPr>
+              <a:t> to the </a:t>
+            </a:r>
+            <a:r>
+              <a:rPr lang="en-US" sz="2200" b="1" dirty="0" smtClean="0">
+                <a:solidFill>
+                  <a:srgbClr val="595959"/>
+                </a:solidFill>
+              </a:rPr>
+              <a:t>SearchData </a:t>
+            </a:r>
+            <a:r>
+              <a:rPr lang="en-US" sz="2200" dirty="0" smtClean="0">
+                <a:solidFill>
+                  <a:srgbClr val="595959"/>
+                </a:solidFill>
+              </a:rPr>
+              <a:t>from the </a:t>
+            </a:r>
+            <a:r>
+              <a:rPr lang="en-US" sz="2200" b="1" dirty="0" smtClean="0">
+                <a:solidFill>
+                  <a:srgbClr val="595959"/>
+                </a:solidFill>
+              </a:rPr>
+              <a:t>PositionManager.</a:t>
+            </a:r>
+          </a:p>
+          <a:p>
+            <a:pPr>
+              <a:lnSpc>
+                <a:spcPct val="50000"/>
+              </a:lnSpc>
+            </a:pPr>
+            <a:endParaRPr lang="en-US" sz="2200" b="1" dirty="0" smtClean="0">
+              <a:solidFill>
+                <a:srgbClr val="595959"/>
+              </a:solidFill>
+            </a:endParaRPr>
+          </a:p>
+          <a:p>
+            <a:pPr marL="342900" indent="-342900">
+              <a:buFont typeface="Arial"/>
+              <a:buChar char="•"/>
+            </a:pPr>
+            <a:r>
+              <a:rPr lang="en-US" sz="2200" dirty="0" smtClean="0">
+                <a:solidFill>
+                  <a:srgbClr val="595959"/>
+                </a:solidFill>
+              </a:rPr>
+              <a:t>The </a:t>
+            </a:r>
+            <a:r>
+              <a:rPr lang="en-US" sz="2200" b="1" dirty="0" smtClean="0">
+                <a:solidFill>
+                  <a:srgbClr val="595959"/>
+                </a:solidFill>
+              </a:rPr>
+              <a:t>NotificationManager</a:t>
+            </a:r>
+            <a:r>
+              <a:rPr lang="en-US" sz="2200" dirty="0" smtClean="0">
+                <a:solidFill>
+                  <a:srgbClr val="595959"/>
+                </a:solidFill>
+              </a:rPr>
+              <a:t>  sends the resulting data to the </a:t>
+            </a:r>
+            <a:r>
+              <a:rPr lang="en-US" sz="2200" b="1" dirty="0" smtClean="0">
+                <a:solidFill>
+                  <a:srgbClr val="595959"/>
+                </a:solidFill>
+              </a:rPr>
+              <a:t>Client device  </a:t>
+            </a:r>
+            <a:r>
+              <a:rPr lang="en-US" sz="2200" dirty="0" smtClean="0">
+                <a:solidFill>
+                  <a:srgbClr val="595959"/>
+                </a:solidFill>
+              </a:rPr>
+              <a:t>which then </a:t>
+            </a:r>
+            <a:r>
+              <a:rPr lang="en-US" sz="2200" b="1" dirty="0" smtClean="0">
+                <a:solidFill>
+                  <a:srgbClr val="595959"/>
+                </a:solidFill>
+              </a:rPr>
+              <a:t>displays</a:t>
+            </a:r>
+            <a:r>
+              <a:rPr lang="en-US" sz="2200" dirty="0" smtClean="0">
+                <a:solidFill>
+                  <a:srgbClr val="595959"/>
+                </a:solidFill>
+              </a:rPr>
+              <a:t> it on screen. </a:t>
+            </a:r>
+          </a:p>
+          <a:p>
+            <a:pPr marL="342900" indent="-342900">
+              <a:buFont typeface="Arial"/>
+              <a:buChar char="•"/>
+            </a:pPr>
+            <a:endParaRPr lang="en-US" sz="2200" b="1" dirty="0" smtClean="0">
+              <a:solidFill>
+                <a:srgbClr val="595959"/>
+              </a:solidFill>
+            </a:endParaRPr>
+          </a:p>
+          <a:p>
+            <a:endParaRPr lang="en-US" sz="2200" b="1" u="sng" dirty="0">
+              <a:solidFill>
+                <a:srgbClr val="595959"/>
+              </a:solidFill>
+            </a:endParaRPr>
+          </a:p>
+          <a:p>
+            <a:endParaRPr lang="en-US" sz="2200" b="1" u="sng" dirty="0">
+              <a:solidFill>
+                <a:srgbClr val="595959"/>
+              </a:solidFill>
+            </a:endParaRPr>
+          </a:p>
+        </p:txBody>
+      </p:sp>
     </p:spTree>
     <p:extLst>
       <p:ext uri="{BB962C8B-B14F-4D97-AF65-F5344CB8AC3E}">
         <p14:creationId xmlns:p14="http://schemas.microsoft.com/office/powerpoint/2010/main" val="2449243911"/>
+      </p:ext>
+    </p:extLst>
+  </p:cSld>
+  <p:clrMapOvr>
+    <a:masterClrMapping/>
+  </p:clrMapOvr>
+  <p:timing>
+    <p:tnLst>
+      <p:par>
+        <p:cTn xmlns:p14="http://schemas.microsoft.com/office/powerpoint/2010/main" id="1" dur="indefinite" restart="never" nodeType="tmRoot"/>
+      </p:par>
+    </p:tnLst>
+  </p:timing>
+</p:sld>
+</file>
+
+<file path=ppt/slides/slide15.xml><?xml version="1.0" encoding="utf-8"?>
+<p:sld xmlns:a="http://schemas.openxmlformats.org/drawingml/2006/main" xmlns:r="http://schemas.openxmlformats.org/officeDocument/2006/relationships" xmlns:p="http://schemas.openxmlformats.org/presentationml/2006/main">
+  <p:cSld>
+    <p:spTree>
+      <p:nvGrpSpPr>
+        <p:cNvPr id="1" name=""/>
+        <p:cNvGrpSpPr/>
+        <p:nvPr/>
+      </p:nvGrpSpPr>
+      <p:grpSpPr>
+        <a:xfrm>
+          <a:off x="0" y="0"/>
+          <a:ext cx="0" cy="0"/>
+          <a:chOff x="0" y="0"/>
+          <a:chExt cx="0" cy="0"/>
+        </a:xfrm>
+      </p:grpSpPr>
+      <p:sp>
+        <p:nvSpPr>
+          <p:cNvPr id="2" name="Title 1"/>
+          <p:cNvSpPr>
+            <a:spLocks noGrp="1"/>
+          </p:cNvSpPr>
+          <p:nvPr>
+            <p:ph type="ctrTitle"/>
+          </p:nvPr>
+        </p:nvSpPr>
+        <p:spPr>
+          <a:xfrm>
+            <a:off x="685800" y="-3210333"/>
+            <a:ext cx="7772400" cy="4267200"/>
+          </a:xfrm>
+        </p:spPr>
+        <p:txBody>
+          <a:bodyPr/>
+          <a:lstStyle/>
+          <a:p>
+            <a:r>
+              <a:rPr lang="en-US" sz="3500" u="sng" dirty="0">
+                <a:solidFill>
+                  <a:schemeClr val="tx1">
+                    <a:lumMod val="65000"/>
+                    <a:lumOff val="35000"/>
+                  </a:schemeClr>
+                </a:solidFill>
+              </a:rPr>
+              <a:t>4</a:t>
+            </a:r>
+            <a:r>
+              <a:rPr lang="en-US" sz="3500" u="sng" dirty="0" smtClean="0">
+                <a:solidFill>
+                  <a:schemeClr val="tx1">
+                    <a:lumMod val="65000"/>
+                    <a:lumOff val="35000"/>
+                  </a:schemeClr>
+                </a:solidFill>
+              </a:rPr>
+              <a:t>.</a:t>
+            </a:r>
+            <a:r>
+              <a:rPr lang="en-US" sz="3500" dirty="0" smtClean="0">
+                <a:solidFill>
+                  <a:schemeClr val="tx1">
+                    <a:lumMod val="65000"/>
+                    <a:lumOff val="35000"/>
+                  </a:schemeClr>
+                </a:solidFill>
+              </a:rPr>
+              <a:t> </a:t>
+            </a:r>
+            <a:r>
+              <a:rPr lang="en-US" sz="3500" u="sng" dirty="0" smtClean="0">
+                <a:solidFill>
+                  <a:schemeClr val="tx1">
+                    <a:lumMod val="65000"/>
+                    <a:lumOff val="35000"/>
+                  </a:schemeClr>
+                </a:solidFill>
+              </a:rPr>
+              <a:t>Algorithm Design</a:t>
+            </a:r>
+            <a:endParaRPr lang="en-US" sz="3500" u="sng" dirty="0">
+              <a:solidFill>
+                <a:schemeClr val="tx1">
+                  <a:lumMod val="65000"/>
+                  <a:lumOff val="35000"/>
+                </a:schemeClr>
+              </a:solidFill>
+            </a:endParaRPr>
+          </a:p>
+        </p:txBody>
+      </p:sp>
+      <p:pic>
+        <p:nvPicPr>
+          <p:cNvPr id="5" name="Picture 4" descr="Logo.png"/>
+          <p:cNvPicPr>
+            <a:picLocks noChangeAspect="1"/>
+          </p:cNvPicPr>
+          <p:nvPr/>
+        </p:nvPicPr>
+        <p:blipFill>
+          <a:blip r:embed="rId2" cstate="print">
+            <a:extLst>
+              <a:ext uri="{28A0092B-C50C-407E-A947-70E740481C1C}">
+                <a14:useLocalDpi xmlns:a14="http://schemas.microsoft.com/office/drawing/2010/main" val="0"/>
+              </a:ext>
+            </a:extLst>
+          </a:blip>
+          <a:stretch>
+            <a:fillRect/>
+          </a:stretch>
+        </p:blipFill>
+        <p:spPr>
+          <a:xfrm>
+            <a:off x="3475205" y="6143475"/>
+            <a:ext cx="2432304" cy="573024"/>
+          </a:xfrm>
+          <a:prstGeom prst="rect">
+            <a:avLst/>
+          </a:prstGeom>
+        </p:spPr>
+      </p:pic>
+      <p:sp>
+        <p:nvSpPr>
+          <p:cNvPr id="3" name="TextBox 2"/>
+          <p:cNvSpPr txBox="1"/>
+          <p:nvPr/>
+        </p:nvSpPr>
+        <p:spPr>
+          <a:xfrm>
+            <a:off x="367213" y="1119527"/>
+            <a:ext cx="8660119" cy="5940087"/>
+          </a:xfrm>
+          <a:prstGeom prst="rect">
+            <a:avLst/>
+          </a:prstGeom>
+          <a:noFill/>
+        </p:spPr>
+        <p:txBody>
+          <a:bodyPr wrap="square" rtlCol="0">
+            <a:spAutoFit/>
+          </a:bodyPr>
+          <a:lstStyle/>
+          <a:p>
+            <a:pPr algn="ctr"/>
+            <a:r>
+              <a:rPr lang="en-US" sz="2200" b="1" u="sng" dirty="0" smtClean="0">
+                <a:solidFill>
+                  <a:srgbClr val="FF6600"/>
+                </a:solidFill>
+              </a:rPr>
+              <a:t>Car Search Algorithm-1</a:t>
+            </a:r>
+          </a:p>
+          <a:p>
+            <a:pPr algn="ctr"/>
+            <a:endParaRPr lang="en-US" sz="2200" b="1" u="sng" dirty="0">
+              <a:solidFill>
+                <a:srgbClr val="FF6600"/>
+              </a:solidFill>
+            </a:endParaRPr>
+          </a:p>
+          <a:p>
+            <a:pPr algn="ctr"/>
+            <a:endParaRPr lang="en-US" sz="2200" b="1" u="sng" dirty="0" smtClean="0">
+              <a:solidFill>
+                <a:srgbClr val="FF6600"/>
+              </a:solidFill>
+            </a:endParaRPr>
+          </a:p>
+          <a:p>
+            <a:r>
+              <a:rPr lang="en-US" sz="2200" dirty="0" smtClean="0">
+                <a:solidFill>
+                  <a:srgbClr val="008000"/>
+                </a:solidFill>
+                <a:latin typeface="Courier New"/>
+                <a:cs typeface="Courier New"/>
+              </a:rPr>
+              <a:t>/* Server-Side in Search Manager */</a:t>
+            </a:r>
+            <a:endParaRPr lang="en-US" sz="2200" dirty="0" smtClean="0">
+              <a:solidFill>
+                <a:schemeClr val="bg2">
+                  <a:lumMod val="50000"/>
+                </a:schemeClr>
+              </a:solidFill>
+              <a:latin typeface="Courier New"/>
+              <a:cs typeface="Courier New"/>
+            </a:endParaRPr>
+          </a:p>
+          <a:p>
+            <a:r>
+              <a:rPr lang="en-US" sz="2200" i="1" u="sng" dirty="0" smtClean="0">
+                <a:solidFill>
+                  <a:schemeClr val="tx1">
+                    <a:lumMod val="95000"/>
+                    <a:lumOff val="5000"/>
+                  </a:schemeClr>
+                </a:solidFill>
+                <a:latin typeface="Courier New"/>
+                <a:cs typeface="Courier New"/>
+              </a:rPr>
+              <a:t>getAvailableCar</a:t>
+            </a:r>
+            <a:r>
+              <a:rPr lang="en-US" sz="2200" dirty="0" smtClean="0">
+                <a:solidFill>
+                  <a:schemeClr val="tx1">
+                    <a:lumMod val="75000"/>
+                    <a:lumOff val="25000"/>
+                  </a:schemeClr>
+                </a:solidFill>
+                <a:latin typeface="Courier New"/>
+                <a:cs typeface="Courier New"/>
+              </a:rPr>
+              <a:t>(SearchData data){</a:t>
+            </a:r>
+          </a:p>
+          <a:p>
+            <a:pPr>
+              <a:lnSpc>
+                <a:spcPct val="50000"/>
+              </a:lnSpc>
+            </a:pPr>
+            <a:endParaRPr lang="en-US" sz="2200" dirty="0" smtClean="0">
+              <a:solidFill>
+                <a:schemeClr val="tx1">
+                  <a:lumMod val="75000"/>
+                  <a:lumOff val="25000"/>
+                </a:schemeClr>
+              </a:solidFill>
+              <a:latin typeface="Courier New"/>
+              <a:cs typeface="Courier New"/>
+            </a:endParaRPr>
+          </a:p>
+          <a:p>
+            <a:r>
+              <a:rPr lang="en-US" sz="2200" dirty="0" smtClean="0">
+                <a:solidFill>
+                  <a:schemeClr val="tx1">
+                    <a:lumMod val="75000"/>
+                    <a:lumOff val="25000"/>
+                  </a:schemeClr>
+                </a:solidFill>
+                <a:latin typeface="Courier New"/>
+                <a:cs typeface="Courier New"/>
+              </a:rPr>
+              <a:t>List&lt;VehicleManager&gt; </a:t>
+            </a:r>
+            <a:r>
+              <a:rPr lang="en-US" sz="2200" dirty="0" smtClean="0">
+                <a:solidFill>
+                  <a:srgbClr val="008000"/>
+                </a:solidFill>
+                <a:latin typeface="Courier New"/>
+                <a:cs typeface="Courier New"/>
+              </a:rPr>
+              <a:t>nearbyCars</a:t>
+            </a:r>
+            <a:r>
+              <a:rPr lang="en-US" sz="2200" dirty="0" smtClean="0">
+                <a:solidFill>
+                  <a:schemeClr val="tx1">
+                    <a:lumMod val="75000"/>
+                    <a:lumOff val="25000"/>
+                  </a:schemeClr>
+                </a:solidFill>
+                <a:latin typeface="Courier New"/>
+                <a:cs typeface="Courier New"/>
+              </a:rPr>
+              <a:t>=</a:t>
+            </a:r>
+            <a:r>
+              <a:rPr lang="en-US" sz="2200" dirty="0" smtClean="0">
+                <a:solidFill>
+                  <a:srgbClr val="FF6600"/>
+                </a:solidFill>
+                <a:latin typeface="Courier New"/>
+                <a:cs typeface="Courier New"/>
+              </a:rPr>
+              <a:t>new</a:t>
+            </a:r>
+            <a:r>
+              <a:rPr lang="en-US" sz="2200" dirty="0" smtClean="0">
+                <a:solidFill>
+                  <a:schemeClr val="tx1">
+                    <a:lumMod val="75000"/>
+                    <a:lumOff val="25000"/>
+                  </a:schemeClr>
+                </a:solidFill>
+                <a:latin typeface="Courier New"/>
+                <a:cs typeface="Courier New"/>
+              </a:rPr>
+              <a:t> ArrayList&lt;&gt;()</a:t>
+            </a:r>
+            <a:r>
+              <a:rPr lang="en-US" sz="2200" dirty="0" smtClean="0">
+                <a:solidFill>
+                  <a:srgbClr val="FF6600"/>
+                </a:solidFill>
+                <a:latin typeface="Courier New"/>
+                <a:cs typeface="Courier New"/>
+              </a:rPr>
+              <a:t>;</a:t>
+            </a:r>
+          </a:p>
+          <a:p>
+            <a:r>
+              <a:rPr lang="en-US" sz="2200" dirty="0" smtClean="0">
+                <a:solidFill>
+                  <a:schemeClr val="tx1">
+                    <a:lumMod val="75000"/>
+                    <a:lumOff val="25000"/>
+                  </a:schemeClr>
+                </a:solidFill>
+                <a:latin typeface="Courier New"/>
+                <a:cs typeface="Courier New"/>
+              </a:rPr>
+              <a:t>Position </a:t>
+            </a:r>
+            <a:r>
+              <a:rPr lang="en-US" sz="2200" dirty="0" smtClean="0">
+                <a:solidFill>
+                  <a:srgbClr val="008000"/>
+                </a:solidFill>
+                <a:latin typeface="Courier New"/>
+                <a:cs typeface="Courier New"/>
+              </a:rPr>
+              <a:t>p</a:t>
+            </a:r>
+            <a:r>
+              <a:rPr lang="en-US" sz="2200" dirty="0" smtClean="0">
+                <a:solidFill>
+                  <a:schemeClr val="tx1">
+                    <a:lumMod val="75000"/>
+                    <a:lumOff val="25000"/>
+                  </a:schemeClr>
+                </a:solidFill>
+                <a:latin typeface="Courier New"/>
+                <a:cs typeface="Courier New"/>
+              </a:rPr>
+              <a:t> = data.getPosition()</a:t>
+            </a:r>
+            <a:r>
+              <a:rPr lang="en-US" sz="2200" dirty="0" smtClean="0">
+                <a:solidFill>
+                  <a:srgbClr val="FF6600"/>
+                </a:solidFill>
+                <a:latin typeface="Courier New"/>
+                <a:cs typeface="Courier New"/>
+              </a:rPr>
+              <a:t>;</a:t>
+            </a:r>
+          </a:p>
+          <a:p>
+            <a:r>
+              <a:rPr lang="en-US" sz="2200" dirty="0" smtClean="0">
+                <a:solidFill>
+                  <a:schemeClr val="tx1">
+                    <a:lumMod val="75000"/>
+                    <a:lumOff val="25000"/>
+                  </a:schemeClr>
+                </a:solidFill>
+                <a:latin typeface="Courier New"/>
+                <a:cs typeface="Courier New"/>
+              </a:rPr>
+              <a:t>Radius </a:t>
+            </a:r>
+            <a:r>
+              <a:rPr lang="en-US" sz="2200" dirty="0" smtClean="0">
+                <a:solidFill>
+                  <a:srgbClr val="008000"/>
+                </a:solidFill>
+                <a:latin typeface="Courier New"/>
+                <a:cs typeface="Courier New"/>
+              </a:rPr>
+              <a:t>r </a:t>
+            </a:r>
+            <a:r>
+              <a:rPr lang="en-US" sz="2200" dirty="0" smtClean="0">
+                <a:solidFill>
+                  <a:schemeClr val="tx1">
+                    <a:lumMod val="75000"/>
+                    <a:lumOff val="25000"/>
+                  </a:schemeClr>
+                </a:solidFill>
+                <a:latin typeface="Courier New"/>
+                <a:cs typeface="Courier New"/>
+              </a:rPr>
+              <a:t>= data.getRadius()</a:t>
+            </a:r>
+            <a:r>
+              <a:rPr lang="en-US" sz="2200" dirty="0" smtClean="0">
+                <a:solidFill>
+                  <a:srgbClr val="FF6600"/>
+                </a:solidFill>
+                <a:latin typeface="Courier New"/>
+                <a:cs typeface="Courier New"/>
+              </a:rPr>
+              <a:t>;</a:t>
+            </a:r>
+          </a:p>
+          <a:p>
+            <a:r>
+              <a:rPr lang="en-US" sz="2200" dirty="0" smtClean="0">
+                <a:solidFill>
+                  <a:schemeClr val="tx1">
+                    <a:lumMod val="75000"/>
+                    <a:lumOff val="25000"/>
+                  </a:schemeClr>
+                </a:solidFill>
+                <a:latin typeface="Courier New"/>
+                <a:cs typeface="Courier New"/>
+              </a:rPr>
+              <a:t>nerabyCars=queryPosManager(p,r)</a:t>
+            </a:r>
+            <a:r>
+              <a:rPr lang="en-US" sz="2200" dirty="0" smtClean="0">
+                <a:solidFill>
+                  <a:srgbClr val="FF6600"/>
+                </a:solidFill>
+                <a:latin typeface="Courier New"/>
+                <a:cs typeface="Courier New"/>
+              </a:rPr>
+              <a:t>;</a:t>
+            </a:r>
+          </a:p>
+          <a:p>
+            <a:r>
+              <a:rPr lang="en-US" sz="1900" dirty="0" smtClean="0">
+                <a:solidFill>
+                  <a:schemeClr val="tx1">
+                    <a:lumMod val="75000"/>
+                    <a:lumOff val="25000"/>
+                  </a:schemeClr>
+                </a:solidFill>
+                <a:latin typeface="Courier New"/>
+                <a:cs typeface="Courier New"/>
+              </a:rPr>
+              <a:t>notificationManager.send(</a:t>
+            </a:r>
+            <a:r>
+              <a:rPr lang="en-US" sz="1900" dirty="0" smtClean="0">
+                <a:solidFill>
+                  <a:schemeClr val="tx2">
+                    <a:lumMod val="60000"/>
+                    <a:lumOff val="40000"/>
+                  </a:schemeClr>
+                </a:solidFill>
+                <a:latin typeface="Courier New"/>
+                <a:cs typeface="Courier New"/>
+              </a:rPr>
+              <a:t>Message,data,data.getUserDevice</a:t>
+            </a:r>
+            <a:r>
+              <a:rPr lang="en-US" sz="1900" dirty="0" smtClean="0">
+                <a:solidFill>
+                  <a:schemeClr val="tx1">
+                    <a:lumMod val="75000"/>
+                    <a:lumOff val="25000"/>
+                  </a:schemeClr>
+                </a:solidFill>
+                <a:latin typeface="Courier New"/>
+                <a:cs typeface="Courier New"/>
+              </a:rPr>
+              <a:t>)</a:t>
+            </a:r>
+            <a:r>
+              <a:rPr lang="en-US" sz="1900" dirty="0" smtClean="0">
+                <a:solidFill>
+                  <a:srgbClr val="FF6600"/>
+                </a:solidFill>
+                <a:latin typeface="Courier New"/>
+                <a:cs typeface="Courier New"/>
+              </a:rPr>
+              <a:t>;</a:t>
+            </a:r>
+          </a:p>
+          <a:p>
+            <a:r>
+              <a:rPr lang="en-US" sz="2200" dirty="0" smtClean="0">
+                <a:solidFill>
+                  <a:schemeClr val="tx1">
+                    <a:lumMod val="75000"/>
+                    <a:lumOff val="25000"/>
+                  </a:schemeClr>
+                </a:solidFill>
+                <a:latin typeface="Courier New"/>
+                <a:cs typeface="Courier New"/>
+              </a:rPr>
+              <a:t>}</a:t>
+            </a:r>
+            <a:endParaRPr lang="en-US" sz="2200" dirty="0">
+              <a:solidFill>
+                <a:schemeClr val="tx1">
+                  <a:lumMod val="75000"/>
+                  <a:lumOff val="25000"/>
+                </a:schemeClr>
+              </a:solidFill>
+              <a:latin typeface="Courier New"/>
+              <a:cs typeface="Courier New"/>
+            </a:endParaRPr>
+          </a:p>
+          <a:p>
+            <a:endParaRPr lang="en-US" sz="2000" dirty="0" smtClean="0">
+              <a:solidFill>
+                <a:schemeClr val="tx1">
+                  <a:lumMod val="75000"/>
+                  <a:lumOff val="25000"/>
+                </a:schemeClr>
+              </a:solidFill>
+              <a:latin typeface="Courier New"/>
+              <a:cs typeface="Courier New"/>
+            </a:endParaRPr>
+          </a:p>
+          <a:p>
+            <a:endParaRPr lang="en-US" sz="2200" b="1" u="sng" dirty="0" smtClean="0">
+              <a:solidFill>
+                <a:srgbClr val="FF6600"/>
+              </a:solidFill>
+            </a:endParaRPr>
+          </a:p>
+          <a:p>
+            <a:pPr algn="ctr"/>
+            <a:endParaRPr lang="en-US" sz="2200" b="1" u="sng" dirty="0" smtClean="0">
+              <a:solidFill>
+                <a:srgbClr val="595959"/>
+              </a:solidFill>
+            </a:endParaRPr>
+          </a:p>
+          <a:p>
+            <a:endParaRPr lang="en-US" sz="2200" b="1" dirty="0" smtClean="0">
+              <a:solidFill>
+                <a:srgbClr val="595959"/>
+              </a:solidFill>
+            </a:endParaRPr>
+          </a:p>
+          <a:p>
+            <a:endParaRPr lang="en-US" sz="2200" b="1" u="sng" dirty="0">
+              <a:solidFill>
+                <a:srgbClr val="595959"/>
+              </a:solidFill>
+            </a:endParaRPr>
+          </a:p>
+          <a:p>
+            <a:endParaRPr lang="en-US" sz="2200" b="1" u="sng" dirty="0">
+              <a:solidFill>
+                <a:srgbClr val="595959"/>
+              </a:solidFill>
+            </a:endParaRPr>
+          </a:p>
+        </p:txBody>
+      </p:sp>
+    </p:spTree>
+    <p:extLst>
+      <p:ext uri="{BB962C8B-B14F-4D97-AF65-F5344CB8AC3E}">
+        <p14:creationId xmlns:p14="http://schemas.microsoft.com/office/powerpoint/2010/main" val="827626067"/>
+      </p:ext>
+    </p:extLst>
+  </p:cSld>
+  <p:clrMapOvr>
+    <a:masterClrMapping/>
+  </p:clrMapOvr>
+  <p:timing>
+    <p:tnLst>
+      <p:par>
+        <p:cTn xmlns:p14="http://schemas.microsoft.com/office/powerpoint/2010/main" id="1" dur="indefinite" restart="never" nodeType="tmRoot"/>
+      </p:par>
+    </p:tnLst>
+  </p:timing>
+</p:sld>
+</file>
+
+<file path=ppt/slides/slide16.xml><?xml version="1.0" encoding="utf-8"?>
+<p:sld xmlns:a="http://schemas.openxmlformats.org/drawingml/2006/main" xmlns:r="http://schemas.openxmlformats.org/officeDocument/2006/relationships" xmlns:p="http://schemas.openxmlformats.org/presentationml/2006/main">
+  <p:cSld>
+    <p:spTree>
+      <p:nvGrpSpPr>
+        <p:cNvPr id="1" name=""/>
+        <p:cNvGrpSpPr/>
+        <p:nvPr/>
+      </p:nvGrpSpPr>
+      <p:grpSpPr>
+        <a:xfrm>
+          <a:off x="0" y="0"/>
+          <a:ext cx="0" cy="0"/>
+          <a:chOff x="0" y="0"/>
+          <a:chExt cx="0" cy="0"/>
+        </a:xfrm>
+      </p:grpSpPr>
+      <p:sp>
+        <p:nvSpPr>
+          <p:cNvPr id="2" name="Title 1"/>
+          <p:cNvSpPr>
+            <a:spLocks noGrp="1"/>
+          </p:cNvSpPr>
+          <p:nvPr>
+            <p:ph type="ctrTitle"/>
+          </p:nvPr>
+        </p:nvSpPr>
+        <p:spPr>
+          <a:xfrm>
+            <a:off x="685800" y="-3210333"/>
+            <a:ext cx="7772400" cy="4267200"/>
+          </a:xfrm>
+        </p:spPr>
+        <p:txBody>
+          <a:bodyPr/>
+          <a:lstStyle/>
+          <a:p>
+            <a:r>
+              <a:rPr lang="en-US" sz="3500" u="sng" dirty="0">
+                <a:solidFill>
+                  <a:schemeClr val="tx1">
+                    <a:lumMod val="65000"/>
+                    <a:lumOff val="35000"/>
+                  </a:schemeClr>
+                </a:solidFill>
+              </a:rPr>
+              <a:t>4</a:t>
+            </a:r>
+            <a:r>
+              <a:rPr lang="en-US" sz="3500" u="sng" dirty="0" smtClean="0">
+                <a:solidFill>
+                  <a:schemeClr val="tx1">
+                    <a:lumMod val="65000"/>
+                    <a:lumOff val="35000"/>
+                  </a:schemeClr>
+                </a:solidFill>
+              </a:rPr>
+              <a:t>.</a:t>
+            </a:r>
+            <a:r>
+              <a:rPr lang="en-US" sz="3500" dirty="0" smtClean="0">
+                <a:solidFill>
+                  <a:schemeClr val="tx1">
+                    <a:lumMod val="65000"/>
+                    <a:lumOff val="35000"/>
+                  </a:schemeClr>
+                </a:solidFill>
+              </a:rPr>
+              <a:t> </a:t>
+            </a:r>
+            <a:r>
+              <a:rPr lang="en-US" sz="3500" u="sng" dirty="0" smtClean="0">
+                <a:solidFill>
+                  <a:schemeClr val="tx1">
+                    <a:lumMod val="65000"/>
+                    <a:lumOff val="35000"/>
+                  </a:schemeClr>
+                </a:solidFill>
+              </a:rPr>
+              <a:t>Algorithm Design</a:t>
+            </a:r>
+            <a:endParaRPr lang="en-US" sz="3500" u="sng" dirty="0">
+              <a:solidFill>
+                <a:schemeClr val="tx1">
+                  <a:lumMod val="65000"/>
+                  <a:lumOff val="35000"/>
+                </a:schemeClr>
+              </a:solidFill>
+            </a:endParaRPr>
+          </a:p>
+        </p:txBody>
+      </p:sp>
+      <p:pic>
+        <p:nvPicPr>
+          <p:cNvPr id="5" name="Picture 4" descr="Logo.png"/>
+          <p:cNvPicPr>
+            <a:picLocks noChangeAspect="1"/>
+          </p:cNvPicPr>
+          <p:nvPr/>
+        </p:nvPicPr>
+        <p:blipFill>
+          <a:blip r:embed="rId2" cstate="print">
+            <a:extLst>
+              <a:ext uri="{28A0092B-C50C-407E-A947-70E740481C1C}">
+                <a14:useLocalDpi xmlns:a14="http://schemas.microsoft.com/office/drawing/2010/main" val="0"/>
+              </a:ext>
+            </a:extLst>
+          </a:blip>
+          <a:stretch>
+            <a:fillRect/>
+          </a:stretch>
+        </p:blipFill>
+        <p:spPr>
+          <a:xfrm>
+            <a:off x="3475205" y="6143475"/>
+            <a:ext cx="2432304" cy="573024"/>
+          </a:xfrm>
+          <a:prstGeom prst="rect">
+            <a:avLst/>
+          </a:prstGeom>
+        </p:spPr>
+      </p:pic>
+      <p:sp>
+        <p:nvSpPr>
+          <p:cNvPr id="3" name="TextBox 2"/>
+          <p:cNvSpPr txBox="1"/>
+          <p:nvPr/>
+        </p:nvSpPr>
+        <p:spPr>
+          <a:xfrm>
+            <a:off x="367213" y="1119527"/>
+            <a:ext cx="8660119" cy="6247864"/>
+          </a:xfrm>
+          <a:prstGeom prst="rect">
+            <a:avLst/>
+          </a:prstGeom>
+          <a:noFill/>
+        </p:spPr>
+        <p:txBody>
+          <a:bodyPr wrap="square" rtlCol="0">
+            <a:spAutoFit/>
+          </a:bodyPr>
+          <a:lstStyle/>
+          <a:p>
+            <a:pPr algn="ctr"/>
+            <a:r>
+              <a:rPr lang="en-US" sz="2200" b="1" u="sng" dirty="0" smtClean="0">
+                <a:solidFill>
+                  <a:srgbClr val="FF6600"/>
+                </a:solidFill>
+              </a:rPr>
+              <a:t>Car Search Algorithm-2</a:t>
+            </a:r>
+          </a:p>
+          <a:p>
+            <a:pPr algn="ctr"/>
+            <a:endParaRPr lang="en-US" sz="2200" b="1" u="sng" dirty="0">
+              <a:solidFill>
+                <a:srgbClr val="FF6600"/>
+              </a:solidFill>
+            </a:endParaRPr>
+          </a:p>
+          <a:p>
+            <a:pPr algn="ctr"/>
+            <a:endParaRPr lang="en-US" sz="2200" b="1" u="sng" dirty="0" smtClean="0">
+              <a:solidFill>
+                <a:srgbClr val="FF6600"/>
+              </a:solidFill>
+            </a:endParaRPr>
+          </a:p>
+          <a:p>
+            <a:r>
+              <a:rPr lang="en-US" sz="2400" dirty="0">
+                <a:solidFill>
+                  <a:srgbClr val="008000"/>
+                </a:solidFill>
+                <a:latin typeface="Courier New"/>
+                <a:cs typeface="Courier New"/>
+              </a:rPr>
+              <a:t>/* Server-Side in Position Manager */</a:t>
+            </a:r>
+          </a:p>
+          <a:p>
+            <a:r>
+              <a:rPr lang="en-US" sz="2400" i="1" u="sng" dirty="0">
+                <a:solidFill>
+                  <a:schemeClr val="tx1">
+                    <a:lumMod val="95000"/>
+                    <a:lumOff val="5000"/>
+                  </a:schemeClr>
+                </a:solidFill>
+                <a:latin typeface="Courier New"/>
+                <a:cs typeface="Courier New"/>
+              </a:rPr>
+              <a:t>getAvailableCarList</a:t>
+            </a:r>
+            <a:r>
+              <a:rPr lang="en-US" sz="2400" dirty="0">
+                <a:solidFill>
+                  <a:srgbClr val="595959"/>
+                </a:solidFill>
+                <a:latin typeface="Courier New"/>
+                <a:cs typeface="Courier New"/>
+              </a:rPr>
+              <a:t>(Position p , Radius r){</a:t>
+            </a:r>
+          </a:p>
+          <a:p>
+            <a:pPr>
+              <a:lnSpc>
+                <a:spcPct val="50000"/>
+              </a:lnSpc>
+            </a:pPr>
+            <a:endParaRPr lang="en-US" sz="2400" dirty="0">
+              <a:solidFill>
+                <a:schemeClr val="tx1">
+                  <a:lumMod val="75000"/>
+                  <a:lumOff val="25000"/>
+                </a:schemeClr>
+              </a:solidFill>
+              <a:latin typeface="Courier New"/>
+              <a:cs typeface="Courier New"/>
+            </a:endParaRPr>
+          </a:p>
+          <a:p>
+            <a:r>
+              <a:rPr lang="en-US" sz="2400" dirty="0">
+                <a:solidFill>
+                  <a:schemeClr val="tx1">
+                    <a:lumMod val="65000"/>
+                    <a:lumOff val="35000"/>
+                  </a:schemeClr>
+                </a:solidFill>
+                <a:latin typeface="Courier New"/>
+                <a:cs typeface="Courier New"/>
+              </a:rPr>
+              <a:t>List&lt;VehicleManager&gt; </a:t>
+            </a:r>
+            <a:r>
+              <a:rPr lang="en-US" sz="2400" dirty="0">
+                <a:solidFill>
+                  <a:srgbClr val="008000"/>
+                </a:solidFill>
+                <a:latin typeface="Courier New"/>
+                <a:cs typeface="Courier New"/>
+              </a:rPr>
+              <a:t>cars</a:t>
+            </a:r>
+            <a:r>
+              <a:rPr lang="en-US" sz="2400" dirty="0">
+                <a:solidFill>
+                  <a:srgbClr val="595959"/>
+                </a:solidFill>
+                <a:latin typeface="Courier New"/>
+                <a:cs typeface="Courier New"/>
+              </a:rPr>
+              <a:t> </a:t>
+            </a:r>
+            <a:r>
+              <a:rPr lang="en-US" sz="2400" dirty="0">
+                <a:solidFill>
+                  <a:schemeClr val="tx1">
+                    <a:lumMod val="65000"/>
+                    <a:lumOff val="35000"/>
+                  </a:schemeClr>
+                </a:solidFill>
+                <a:latin typeface="Courier New"/>
+                <a:cs typeface="Courier New"/>
+              </a:rPr>
+              <a:t>= </a:t>
+            </a:r>
+            <a:r>
+              <a:rPr lang="en-US" sz="2400" dirty="0">
+                <a:solidFill>
+                  <a:srgbClr val="FF6600"/>
+                </a:solidFill>
+                <a:latin typeface="Courier New"/>
+                <a:cs typeface="Courier New"/>
+              </a:rPr>
+              <a:t>new</a:t>
+            </a:r>
+            <a:r>
+              <a:rPr lang="en-US" sz="2400" dirty="0">
+                <a:solidFill>
+                  <a:schemeClr val="tx1">
+                    <a:lumMod val="65000"/>
+                    <a:lumOff val="35000"/>
+                  </a:schemeClr>
+                </a:solidFill>
+                <a:latin typeface="Courier New"/>
+                <a:cs typeface="Courier New"/>
+              </a:rPr>
+              <a:t> ArrayList&lt;&gt;();</a:t>
+            </a:r>
+          </a:p>
+          <a:p>
+            <a:r>
+              <a:rPr lang="en-US" sz="2400" dirty="0">
+                <a:solidFill>
+                  <a:srgbClr val="FF6600"/>
+                </a:solidFill>
+                <a:latin typeface="Courier New"/>
+                <a:cs typeface="Courier New"/>
+              </a:rPr>
+              <a:t>for</a:t>
+            </a:r>
+            <a:r>
+              <a:rPr lang="en-US" sz="2400" dirty="0">
+                <a:solidFill>
+                  <a:schemeClr val="tx1">
+                    <a:lumMod val="65000"/>
+                    <a:lumOff val="35000"/>
+                  </a:schemeClr>
+                </a:solidFill>
+                <a:latin typeface="Courier New"/>
+                <a:cs typeface="Courier New"/>
+              </a:rPr>
+              <a:t>(VehicleManager </a:t>
+            </a:r>
+            <a:r>
+              <a:rPr lang="en-US" sz="2400" dirty="0">
+                <a:solidFill>
+                  <a:srgbClr val="008000"/>
+                </a:solidFill>
+                <a:latin typeface="Courier New"/>
+                <a:cs typeface="Courier New"/>
+              </a:rPr>
+              <a:t>v</a:t>
+            </a:r>
+            <a:r>
+              <a:rPr lang="en-US" sz="2400" dirty="0">
+                <a:solidFill>
+                  <a:schemeClr val="tx1">
+                    <a:lumMod val="65000"/>
+                    <a:lumOff val="35000"/>
+                  </a:schemeClr>
+                </a:solidFill>
+                <a:latin typeface="Courier New"/>
+                <a:cs typeface="Courier New"/>
+              </a:rPr>
+              <a:t> : Vehicles){</a:t>
+            </a:r>
+          </a:p>
+          <a:p>
+            <a:r>
+              <a:rPr lang="en-US" sz="2400" dirty="0">
+                <a:solidFill>
+                  <a:schemeClr val="tx1">
+                    <a:lumMod val="65000"/>
+                    <a:lumOff val="35000"/>
+                  </a:schemeClr>
+                </a:solidFill>
+                <a:latin typeface="Courier New"/>
+                <a:cs typeface="Courier New"/>
+              </a:rPr>
+              <a:t>	</a:t>
+            </a:r>
+            <a:r>
+              <a:rPr lang="en-US" sz="2400" dirty="0">
+                <a:solidFill>
+                  <a:srgbClr val="FF6600"/>
+                </a:solidFill>
+                <a:latin typeface="Courier New"/>
+                <a:cs typeface="Courier New"/>
+              </a:rPr>
+              <a:t>if</a:t>
+            </a:r>
+            <a:r>
+              <a:rPr lang="en-US" sz="2400" dirty="0">
+                <a:solidFill>
+                  <a:schemeClr val="tx1">
+                    <a:lumMod val="65000"/>
+                    <a:lumOff val="35000"/>
+                  </a:schemeClr>
+                </a:solidFill>
+                <a:latin typeface="Courier New"/>
+                <a:cs typeface="Courier New"/>
+              </a:rPr>
+              <a:t>(distance(</a:t>
+            </a:r>
+            <a:r>
+              <a:rPr lang="en-US" sz="2400" dirty="0">
+                <a:solidFill>
+                  <a:schemeClr val="tx2">
+                    <a:lumMod val="60000"/>
+                    <a:lumOff val="40000"/>
+                  </a:schemeClr>
+                </a:solidFill>
+                <a:latin typeface="Courier New"/>
+                <a:cs typeface="Courier New"/>
+              </a:rPr>
+              <a:t>v.position(),p</a:t>
+            </a:r>
+            <a:r>
+              <a:rPr lang="en-US" sz="2400" dirty="0">
+                <a:solidFill>
+                  <a:schemeClr val="tx1">
+                    <a:lumMod val="65000"/>
+                    <a:lumOff val="35000"/>
+                  </a:schemeClr>
+                </a:solidFill>
+                <a:latin typeface="Courier New"/>
+                <a:cs typeface="Courier New"/>
+              </a:rPr>
+              <a:t>)&lt;r)</a:t>
+            </a:r>
+          </a:p>
+          <a:p>
+            <a:r>
+              <a:rPr lang="en-US" sz="2400" dirty="0">
+                <a:solidFill>
+                  <a:schemeClr val="tx1">
+                    <a:lumMod val="65000"/>
+                    <a:lumOff val="35000"/>
+                  </a:schemeClr>
+                </a:solidFill>
+                <a:latin typeface="Courier New"/>
+                <a:cs typeface="Courier New"/>
+              </a:rPr>
+              <a:t>		cars.add(v);</a:t>
+            </a:r>
+          </a:p>
+          <a:p>
+            <a:r>
+              <a:rPr lang="en-US" sz="2400" dirty="0">
+                <a:solidFill>
+                  <a:schemeClr val="tx1">
+                    <a:lumMod val="65000"/>
+                    <a:lumOff val="35000"/>
+                  </a:schemeClr>
+                </a:solidFill>
+                <a:latin typeface="Courier New"/>
+                <a:cs typeface="Courier New"/>
+              </a:rPr>
+              <a:t>}</a:t>
+            </a:r>
+          </a:p>
+          <a:p>
+            <a:r>
+              <a:rPr lang="en-US" sz="2400" dirty="0" smtClean="0">
+                <a:solidFill>
+                  <a:srgbClr val="FF6600"/>
+                </a:solidFill>
+                <a:latin typeface="Courier New"/>
+                <a:cs typeface="Courier New"/>
+              </a:rPr>
+              <a:t>return</a:t>
+            </a:r>
+            <a:r>
+              <a:rPr lang="en-US" sz="2400" dirty="0" smtClean="0">
+                <a:solidFill>
+                  <a:schemeClr val="tx1">
+                    <a:lumMod val="65000"/>
+                    <a:lumOff val="35000"/>
+                  </a:schemeClr>
+                </a:solidFill>
+                <a:latin typeface="Courier New"/>
+                <a:cs typeface="Courier New"/>
+              </a:rPr>
+              <a:t> </a:t>
+            </a:r>
+            <a:r>
+              <a:rPr lang="en-US" sz="2400" dirty="0">
+                <a:solidFill>
+                  <a:srgbClr val="008000"/>
+                </a:solidFill>
+                <a:latin typeface="Courier New"/>
+                <a:cs typeface="Courier New"/>
+              </a:rPr>
+              <a:t>cars</a:t>
+            </a:r>
+            <a:r>
+              <a:rPr lang="en-US" sz="2400" dirty="0">
+                <a:solidFill>
+                  <a:schemeClr val="tx1">
+                    <a:lumMod val="65000"/>
+                    <a:lumOff val="35000"/>
+                  </a:schemeClr>
+                </a:solidFill>
+                <a:latin typeface="Courier New"/>
+                <a:cs typeface="Courier New"/>
+              </a:rPr>
+              <a:t>;</a:t>
+            </a:r>
+          </a:p>
+          <a:p>
+            <a:endParaRPr lang="en-US" sz="2000" dirty="0" smtClean="0">
+              <a:solidFill>
+                <a:schemeClr val="tx1">
+                  <a:lumMod val="75000"/>
+                  <a:lumOff val="25000"/>
+                </a:schemeClr>
+              </a:solidFill>
+              <a:latin typeface="Courier New"/>
+              <a:cs typeface="Courier New"/>
+            </a:endParaRPr>
+          </a:p>
+          <a:p>
+            <a:endParaRPr lang="en-US" sz="2200" b="1" u="sng" dirty="0" smtClean="0">
+              <a:solidFill>
+                <a:srgbClr val="FF6600"/>
+              </a:solidFill>
+            </a:endParaRPr>
+          </a:p>
+          <a:p>
+            <a:pPr algn="ctr"/>
+            <a:endParaRPr lang="en-US" sz="2200" b="1" u="sng" dirty="0" smtClean="0">
+              <a:solidFill>
+                <a:srgbClr val="595959"/>
+              </a:solidFill>
+            </a:endParaRPr>
+          </a:p>
+          <a:p>
+            <a:endParaRPr lang="en-US" sz="2200" b="1" dirty="0" smtClean="0">
+              <a:solidFill>
+                <a:srgbClr val="595959"/>
+              </a:solidFill>
+            </a:endParaRPr>
+          </a:p>
+          <a:p>
+            <a:endParaRPr lang="en-US" sz="2200" b="1" u="sng" dirty="0">
+              <a:solidFill>
+                <a:srgbClr val="595959"/>
+              </a:solidFill>
+            </a:endParaRPr>
+          </a:p>
+          <a:p>
+            <a:endParaRPr lang="en-US" sz="2200" b="1" u="sng" dirty="0">
+              <a:solidFill>
+                <a:srgbClr val="595959"/>
+              </a:solidFill>
+            </a:endParaRPr>
+          </a:p>
+        </p:txBody>
+      </p:sp>
+    </p:spTree>
+    <p:extLst>
+      <p:ext uri="{BB962C8B-B14F-4D97-AF65-F5344CB8AC3E}">
+        <p14:creationId xmlns:p14="http://schemas.microsoft.com/office/powerpoint/2010/main" val="4265807676"/>
+      </p:ext>
+    </p:extLst>
+  </p:cSld>
+  <p:clrMapOvr>
+    <a:masterClrMapping/>
+  </p:clrMapOvr>
+  <p:timing>
+    <p:tnLst>
+      <p:par>
+        <p:cTn xmlns:p14="http://schemas.microsoft.com/office/powerpoint/2010/main" id="1" dur="indefinite" restart="never" nodeType="tmRoot"/>
+      </p:par>
+    </p:tnLst>
+  </p:timing>
+</p:sld>
+</file>
+
+<file path=ppt/slides/slide17.xml><?xml version="1.0" encoding="utf-8"?>
+<p:sld xmlns:a="http://schemas.openxmlformats.org/drawingml/2006/main" xmlns:r="http://schemas.openxmlformats.org/officeDocument/2006/relationships" xmlns:p="http://schemas.openxmlformats.org/presentationml/2006/main">
+  <p:cSld>
+    <p:spTree>
+      <p:nvGrpSpPr>
+        <p:cNvPr id="1" name=""/>
+        <p:cNvGrpSpPr/>
+        <p:nvPr/>
+      </p:nvGrpSpPr>
+      <p:grpSpPr>
+        <a:xfrm>
+          <a:off x="0" y="0"/>
+          <a:ext cx="0" cy="0"/>
+          <a:chOff x="0" y="0"/>
+          <a:chExt cx="0" cy="0"/>
+        </a:xfrm>
+      </p:grpSpPr>
+      <p:sp>
+        <p:nvSpPr>
+          <p:cNvPr id="2" name="Title 1"/>
+          <p:cNvSpPr>
+            <a:spLocks noGrp="1"/>
+          </p:cNvSpPr>
+          <p:nvPr>
+            <p:ph type="ctrTitle"/>
+          </p:nvPr>
+        </p:nvSpPr>
+        <p:spPr>
+          <a:xfrm>
+            <a:off x="685800" y="-3210333"/>
+            <a:ext cx="7772400" cy="4267200"/>
+          </a:xfrm>
+        </p:spPr>
+        <p:txBody>
+          <a:bodyPr/>
+          <a:lstStyle/>
+          <a:p>
+            <a:r>
+              <a:rPr lang="en-US" sz="3500" u="sng" dirty="0">
+                <a:solidFill>
+                  <a:schemeClr val="tx1">
+                    <a:lumMod val="65000"/>
+                    <a:lumOff val="35000"/>
+                  </a:schemeClr>
+                </a:solidFill>
+              </a:rPr>
+              <a:t>4</a:t>
+            </a:r>
+            <a:r>
+              <a:rPr lang="en-US" sz="3500" u="sng" dirty="0" smtClean="0">
+                <a:solidFill>
+                  <a:schemeClr val="tx1">
+                    <a:lumMod val="65000"/>
+                    <a:lumOff val="35000"/>
+                  </a:schemeClr>
+                </a:solidFill>
+              </a:rPr>
+              <a:t>.</a:t>
+            </a:r>
+            <a:r>
+              <a:rPr lang="en-US" sz="3500" dirty="0" smtClean="0">
+                <a:solidFill>
+                  <a:schemeClr val="tx1">
+                    <a:lumMod val="65000"/>
+                    <a:lumOff val="35000"/>
+                  </a:schemeClr>
+                </a:solidFill>
+              </a:rPr>
+              <a:t> </a:t>
+            </a:r>
+            <a:r>
+              <a:rPr lang="en-US" sz="3500" u="sng" dirty="0" smtClean="0">
+                <a:solidFill>
+                  <a:schemeClr val="tx1">
+                    <a:lumMod val="65000"/>
+                    <a:lumOff val="35000"/>
+                  </a:schemeClr>
+                </a:solidFill>
+              </a:rPr>
+              <a:t>Algorithm Design</a:t>
+            </a:r>
+            <a:endParaRPr lang="en-US" sz="3500" u="sng" dirty="0">
+              <a:solidFill>
+                <a:schemeClr val="tx1">
+                  <a:lumMod val="65000"/>
+                  <a:lumOff val="35000"/>
+                </a:schemeClr>
+              </a:solidFill>
+            </a:endParaRPr>
+          </a:p>
+        </p:txBody>
+      </p:sp>
+      <p:pic>
+        <p:nvPicPr>
+          <p:cNvPr id="5" name="Picture 4" descr="Logo.png"/>
+          <p:cNvPicPr>
+            <a:picLocks noChangeAspect="1"/>
+          </p:cNvPicPr>
+          <p:nvPr/>
+        </p:nvPicPr>
+        <p:blipFill>
+          <a:blip r:embed="rId2" cstate="print">
+            <a:extLst>
+              <a:ext uri="{28A0092B-C50C-407E-A947-70E740481C1C}">
+                <a14:useLocalDpi xmlns:a14="http://schemas.microsoft.com/office/drawing/2010/main" val="0"/>
+              </a:ext>
+            </a:extLst>
+          </a:blip>
+          <a:stretch>
+            <a:fillRect/>
+          </a:stretch>
+        </p:blipFill>
+        <p:spPr>
+          <a:xfrm>
+            <a:off x="3475205" y="6143475"/>
+            <a:ext cx="2432304" cy="573024"/>
+          </a:xfrm>
+          <a:prstGeom prst="rect">
+            <a:avLst/>
+          </a:prstGeom>
+        </p:spPr>
+      </p:pic>
+      <p:sp>
+        <p:nvSpPr>
+          <p:cNvPr id="3" name="TextBox 2"/>
+          <p:cNvSpPr txBox="1"/>
+          <p:nvPr/>
+        </p:nvSpPr>
+        <p:spPr>
+          <a:xfrm>
+            <a:off x="367213" y="1119527"/>
+            <a:ext cx="8660119" cy="6924972"/>
+          </a:xfrm>
+          <a:prstGeom prst="rect">
+            <a:avLst/>
+          </a:prstGeom>
+          <a:noFill/>
+        </p:spPr>
+        <p:txBody>
+          <a:bodyPr wrap="square" rtlCol="0">
+            <a:spAutoFit/>
+          </a:bodyPr>
+          <a:lstStyle/>
+          <a:p>
+            <a:pPr algn="ctr"/>
+            <a:r>
+              <a:rPr lang="en-US" sz="2200" b="1" u="sng" dirty="0" smtClean="0">
+                <a:solidFill>
+                  <a:srgbClr val="FF6600"/>
+                </a:solidFill>
+              </a:rPr>
+              <a:t>Car Search Algorithm-3</a:t>
+            </a:r>
+          </a:p>
+          <a:p>
+            <a:r>
+              <a:rPr lang="en-US" sz="2400" dirty="0">
+                <a:solidFill>
+                  <a:srgbClr val="008000"/>
+                </a:solidFill>
+                <a:latin typeface="Courier New"/>
+                <a:cs typeface="Courier New"/>
+              </a:rPr>
+              <a:t>/* </a:t>
+            </a:r>
+            <a:r>
+              <a:rPr lang="en-US" sz="2400" dirty="0" smtClean="0">
+                <a:solidFill>
+                  <a:srgbClr val="008000"/>
+                </a:solidFill>
+                <a:latin typeface="Courier New"/>
+                <a:cs typeface="Courier New"/>
+              </a:rPr>
+              <a:t>Client-Side*/</a:t>
+            </a:r>
+          </a:p>
+          <a:p>
+            <a:r>
+              <a:rPr lang="en-US" sz="2400" dirty="0" smtClean="0">
+                <a:solidFill>
+                  <a:srgbClr val="595959"/>
+                </a:solidFill>
+                <a:latin typeface="Courier New"/>
+                <a:cs typeface="Courier New"/>
+              </a:rPr>
+              <a:t>...</a:t>
+            </a:r>
+            <a:endParaRPr lang="en-US" sz="2400" dirty="0">
+              <a:solidFill>
+                <a:srgbClr val="595959"/>
+              </a:solidFill>
+              <a:latin typeface="Courier New"/>
+              <a:cs typeface="Courier New"/>
+            </a:endParaRPr>
+          </a:p>
+          <a:p>
+            <a:r>
+              <a:rPr lang="en-US" sz="2200" dirty="0" smtClean="0">
+                <a:solidFill>
+                  <a:srgbClr val="595959"/>
+                </a:solidFill>
+                <a:latin typeface="Courier New"/>
+                <a:cs typeface="Courier New"/>
+              </a:rPr>
+              <a:t>mainAction.displayMap(</a:t>
+            </a:r>
+            <a:r>
+              <a:rPr lang="en-US" sz="2200" dirty="0" smtClean="0">
+                <a:solidFill>
+                  <a:schemeClr val="tx2">
+                    <a:lumMod val="60000"/>
+                    <a:lumOff val="40000"/>
+                  </a:schemeClr>
+                </a:solidFill>
+                <a:latin typeface="Courier New"/>
+                <a:cs typeface="Courier New"/>
+              </a:rPr>
+              <a:t>cars</a:t>
+            </a:r>
+            <a:r>
+              <a:rPr lang="en-US" sz="2200" dirty="0" smtClean="0">
+                <a:solidFill>
+                  <a:srgbClr val="595959"/>
+                </a:solidFill>
+                <a:latin typeface="Courier New"/>
+                <a:cs typeface="Courier New"/>
+              </a:rPr>
+              <a:t>);</a:t>
+            </a:r>
+          </a:p>
+          <a:p>
+            <a:r>
+              <a:rPr lang="en-US" sz="2200" dirty="0" smtClean="0">
+                <a:solidFill>
+                  <a:srgbClr val="595959"/>
+                </a:solidFill>
+                <a:latin typeface="Courier New"/>
+                <a:cs typeface="Courier New"/>
+              </a:rPr>
+              <a:t>...</a:t>
+            </a:r>
+          </a:p>
+          <a:p>
+            <a:endParaRPr lang="en-US" sz="2200" dirty="0">
+              <a:solidFill>
+                <a:srgbClr val="595959"/>
+              </a:solidFill>
+              <a:latin typeface="Courier New"/>
+              <a:cs typeface="Courier New"/>
+            </a:endParaRPr>
+          </a:p>
+          <a:p>
+            <a:r>
+              <a:rPr lang="en-US" sz="2200" i="1" u="sng" dirty="0" smtClean="0">
+                <a:solidFill>
+                  <a:schemeClr val="tx1">
+                    <a:lumMod val="85000"/>
+                    <a:lumOff val="15000"/>
+                  </a:schemeClr>
+                </a:solidFill>
+                <a:latin typeface="Courier New"/>
+                <a:cs typeface="Courier New"/>
+              </a:rPr>
+              <a:t>displayMaps</a:t>
+            </a:r>
+            <a:r>
+              <a:rPr lang="en-US" sz="2200" dirty="0" smtClean="0">
+                <a:solidFill>
+                  <a:srgbClr val="595959"/>
+                </a:solidFill>
+                <a:latin typeface="Courier New"/>
+                <a:cs typeface="Courier New"/>
+              </a:rPr>
+              <a:t>(List&lt;VehicleManager&gt; cars){</a:t>
+            </a:r>
+          </a:p>
+          <a:p>
+            <a:r>
+              <a:rPr lang="en-US" sz="2200" dirty="0" smtClean="0">
+                <a:solidFill>
+                  <a:srgbClr val="595959"/>
+                </a:solidFill>
+                <a:latin typeface="Courier New"/>
+                <a:cs typeface="Courier New"/>
+              </a:rPr>
+              <a:t>	Map </a:t>
+            </a:r>
+            <a:r>
+              <a:rPr lang="en-US" sz="2200" dirty="0" smtClean="0">
+                <a:solidFill>
+                  <a:srgbClr val="008000"/>
+                </a:solidFill>
+                <a:latin typeface="Courier New"/>
+                <a:cs typeface="Courier New"/>
+              </a:rPr>
+              <a:t>map</a:t>
+            </a:r>
+            <a:r>
+              <a:rPr lang="en-US" sz="2200" dirty="0" smtClean="0">
+                <a:solidFill>
+                  <a:srgbClr val="595959"/>
+                </a:solidFill>
+                <a:latin typeface="Courier New"/>
+                <a:cs typeface="Courier New"/>
+              </a:rPr>
+              <a:t> = GoogleMaps.getMap();</a:t>
+            </a:r>
+          </a:p>
+          <a:p>
+            <a:r>
+              <a:rPr lang="en-US" sz="2200" dirty="0">
+                <a:solidFill>
+                  <a:srgbClr val="595959"/>
+                </a:solidFill>
+                <a:latin typeface="Courier New"/>
+                <a:cs typeface="Courier New"/>
+              </a:rPr>
+              <a:t>	</a:t>
+            </a:r>
+            <a:r>
+              <a:rPr lang="en-US" sz="2200" dirty="0" smtClean="0">
+                <a:solidFill>
+                  <a:srgbClr val="008000"/>
+                </a:solidFill>
+                <a:latin typeface="Courier New"/>
+                <a:cs typeface="Courier New"/>
+              </a:rPr>
+              <a:t>map</a:t>
+            </a:r>
+            <a:r>
+              <a:rPr lang="en-US" sz="2200" dirty="0" smtClean="0">
+                <a:solidFill>
+                  <a:srgbClr val="595959"/>
+                </a:solidFill>
+                <a:latin typeface="Courier New"/>
+                <a:cs typeface="Courier New"/>
+              </a:rPr>
+              <a:t>.render();</a:t>
+            </a:r>
+          </a:p>
+          <a:p>
+            <a:r>
+              <a:rPr lang="en-US" sz="2200" dirty="0">
+                <a:solidFill>
+                  <a:srgbClr val="595959"/>
+                </a:solidFill>
+                <a:latin typeface="Courier New"/>
+                <a:cs typeface="Courier New"/>
+              </a:rPr>
+              <a:t>	</a:t>
+            </a:r>
+            <a:r>
+              <a:rPr lang="en-US" sz="2200" dirty="0" smtClean="0">
+                <a:solidFill>
+                  <a:srgbClr val="FF6600"/>
+                </a:solidFill>
+                <a:latin typeface="Courier New"/>
+                <a:cs typeface="Courier New"/>
+              </a:rPr>
+              <a:t>for</a:t>
+            </a:r>
+            <a:r>
+              <a:rPr lang="en-US" sz="2200" dirty="0" smtClean="0">
+                <a:solidFill>
+                  <a:srgbClr val="595959"/>
+                </a:solidFill>
+                <a:latin typeface="Courier New"/>
+                <a:cs typeface="Courier New"/>
+              </a:rPr>
+              <a:t>(VehicleManager </a:t>
+            </a:r>
+            <a:r>
+              <a:rPr lang="en-US" sz="2200" dirty="0" smtClean="0">
+                <a:solidFill>
+                  <a:srgbClr val="008000"/>
+                </a:solidFill>
+                <a:latin typeface="Courier New"/>
+                <a:cs typeface="Courier New"/>
+              </a:rPr>
+              <a:t>v</a:t>
+            </a:r>
+            <a:r>
+              <a:rPr lang="en-US" sz="2200" dirty="0" smtClean="0">
+                <a:solidFill>
+                  <a:srgbClr val="595959"/>
+                </a:solidFill>
+                <a:latin typeface="Courier New"/>
+                <a:cs typeface="Courier New"/>
+              </a:rPr>
+              <a:t>: cars){</a:t>
+            </a:r>
+          </a:p>
+          <a:p>
+            <a:r>
+              <a:rPr lang="en-US" sz="2200" dirty="0" smtClean="0">
+                <a:solidFill>
+                  <a:srgbClr val="595959"/>
+                </a:solidFill>
+                <a:latin typeface="Courier New"/>
+                <a:cs typeface="Courier New"/>
+              </a:rPr>
+              <a:t>		Position </a:t>
+            </a:r>
+            <a:r>
+              <a:rPr lang="en-US" sz="2200" dirty="0" smtClean="0">
+                <a:solidFill>
+                  <a:srgbClr val="008000"/>
+                </a:solidFill>
+                <a:latin typeface="Courier New"/>
+                <a:cs typeface="Courier New"/>
+              </a:rPr>
+              <a:t>p</a:t>
+            </a:r>
+            <a:r>
+              <a:rPr lang="en-US" sz="2200" dirty="0" smtClean="0">
+                <a:solidFill>
+                  <a:srgbClr val="595959"/>
+                </a:solidFill>
+                <a:latin typeface="Courier New"/>
+                <a:cs typeface="Courier New"/>
+              </a:rPr>
+              <a:t>= v.getPosition();</a:t>
+            </a:r>
+          </a:p>
+          <a:p>
+            <a:r>
+              <a:rPr lang="en-US" sz="2200" dirty="0">
+                <a:solidFill>
+                  <a:srgbClr val="595959"/>
+                </a:solidFill>
+                <a:latin typeface="Courier New"/>
+                <a:cs typeface="Courier New"/>
+              </a:rPr>
+              <a:t>	</a:t>
+            </a:r>
+            <a:r>
+              <a:rPr lang="en-US" sz="2200" dirty="0" smtClean="0">
+                <a:solidFill>
+                  <a:srgbClr val="595959"/>
+                </a:solidFill>
+                <a:latin typeface="Courier New"/>
+                <a:cs typeface="Courier New"/>
+              </a:rPr>
+              <a:t>	</a:t>
+            </a:r>
+            <a:r>
+              <a:rPr lang="en-US" sz="2200" dirty="0" smtClean="0">
+                <a:solidFill>
+                  <a:srgbClr val="008000"/>
+                </a:solidFill>
+                <a:latin typeface="Courier New"/>
+                <a:cs typeface="Courier New"/>
+              </a:rPr>
+              <a:t>mapIndicator</a:t>
+            </a:r>
+            <a:r>
+              <a:rPr lang="en-US" sz="2200" dirty="0" smtClean="0">
+                <a:solidFill>
+                  <a:srgbClr val="595959"/>
+                </a:solidFill>
+                <a:latin typeface="Courier New"/>
+                <a:cs typeface="Courier New"/>
+              </a:rPr>
+              <a:t>= new MapIndicator(</a:t>
+            </a:r>
+            <a:r>
+              <a:rPr lang="en-US" sz="2200" dirty="0" smtClean="0">
+                <a:solidFill>
+                  <a:srgbClr val="008000"/>
+                </a:solidFill>
+                <a:latin typeface="Courier New"/>
+                <a:cs typeface="Courier New"/>
+              </a:rPr>
+              <a:t>p</a:t>
+            </a:r>
+            <a:r>
+              <a:rPr lang="en-US" sz="2200" dirty="0" smtClean="0">
+                <a:solidFill>
+                  <a:srgbClr val="595959"/>
+                </a:solidFill>
+                <a:latin typeface="Courier New"/>
+                <a:cs typeface="Courier New"/>
+              </a:rPr>
+              <a:t>);</a:t>
+            </a:r>
+          </a:p>
+          <a:p>
+            <a:r>
+              <a:rPr lang="en-US" sz="2200" dirty="0" smtClean="0">
+                <a:solidFill>
+                  <a:srgbClr val="595959"/>
+                </a:solidFill>
+                <a:latin typeface="Courier New"/>
+                <a:cs typeface="Courier New"/>
+              </a:rPr>
+              <a:t>		</a:t>
+            </a:r>
+            <a:r>
+              <a:rPr lang="en-US" sz="2200" dirty="0" smtClean="0">
+                <a:solidFill>
+                  <a:srgbClr val="008000"/>
+                </a:solidFill>
+                <a:latin typeface="Courier New"/>
+                <a:cs typeface="Courier New"/>
+              </a:rPr>
+              <a:t>mapIndicator</a:t>
+            </a:r>
+            <a:r>
+              <a:rPr lang="en-US" sz="2200" dirty="0" smtClean="0">
+                <a:solidFill>
+                  <a:srgbClr val="595959"/>
+                </a:solidFill>
+                <a:latin typeface="Courier New"/>
+                <a:cs typeface="Courier New"/>
+              </a:rPr>
+              <a:t>.render();</a:t>
+            </a:r>
+          </a:p>
+          <a:p>
+            <a:r>
+              <a:rPr lang="en-US" sz="2200" dirty="0">
+                <a:solidFill>
+                  <a:srgbClr val="595959"/>
+                </a:solidFill>
+                <a:latin typeface="Courier New"/>
+                <a:cs typeface="Courier New"/>
+              </a:rPr>
+              <a:t>	</a:t>
+            </a:r>
+            <a:r>
+              <a:rPr lang="en-US" sz="2200" dirty="0" smtClean="0">
+                <a:solidFill>
+                  <a:srgbClr val="595959"/>
+                </a:solidFill>
+                <a:latin typeface="Courier New"/>
+                <a:cs typeface="Courier New"/>
+              </a:rPr>
+              <a:t>}</a:t>
+            </a:r>
+            <a:endParaRPr lang="en-US" sz="2200" dirty="0">
+              <a:solidFill>
+                <a:srgbClr val="595959"/>
+              </a:solidFill>
+              <a:latin typeface="Courier New"/>
+              <a:cs typeface="Courier New"/>
+            </a:endParaRPr>
+          </a:p>
+          <a:p>
+            <a:r>
+              <a:rPr lang="en-US" sz="2200" dirty="0" smtClean="0">
+                <a:solidFill>
+                  <a:srgbClr val="595959"/>
+                </a:solidFill>
+                <a:latin typeface="Courier New"/>
+                <a:cs typeface="Courier New"/>
+              </a:rPr>
+              <a:t>}</a:t>
+            </a:r>
+          </a:p>
+          <a:p>
+            <a:endParaRPr lang="en-US" sz="2200" dirty="0" smtClean="0">
+              <a:solidFill>
+                <a:srgbClr val="595959"/>
+              </a:solidFill>
+              <a:latin typeface="Courier New"/>
+              <a:cs typeface="Courier New"/>
+            </a:endParaRPr>
+          </a:p>
+          <a:p>
+            <a:pPr algn="ctr"/>
+            <a:endParaRPr lang="en-US" sz="2200" b="1" u="sng" dirty="0" smtClean="0">
+              <a:solidFill>
+                <a:srgbClr val="595959"/>
+              </a:solidFill>
+            </a:endParaRPr>
+          </a:p>
+          <a:p>
+            <a:endParaRPr lang="en-US" sz="2200" b="1" dirty="0" smtClean="0">
+              <a:solidFill>
+                <a:srgbClr val="595959"/>
+              </a:solidFill>
+            </a:endParaRPr>
+          </a:p>
+          <a:p>
+            <a:endParaRPr lang="en-US" sz="2200" b="1" u="sng" dirty="0">
+              <a:solidFill>
+                <a:srgbClr val="595959"/>
+              </a:solidFill>
+            </a:endParaRPr>
+          </a:p>
+          <a:p>
+            <a:endParaRPr lang="en-US" sz="2200" b="1" u="sng" dirty="0">
+              <a:solidFill>
+                <a:srgbClr val="595959"/>
+              </a:solidFill>
+            </a:endParaRPr>
+          </a:p>
+        </p:txBody>
+      </p:sp>
+    </p:spTree>
+    <p:extLst>
+      <p:ext uri="{BB962C8B-B14F-4D97-AF65-F5344CB8AC3E}">
+        <p14:creationId xmlns:p14="http://schemas.microsoft.com/office/powerpoint/2010/main" val="1064512291"/>
+      </p:ext>
+    </p:extLst>
+  </p:cSld>
+  <p:clrMapOvr>
+    <a:masterClrMapping/>
+  </p:clrMapOvr>
+  <p:timing>
+    <p:tnLst>
+      <p:par>
+        <p:cTn xmlns:p14="http://schemas.microsoft.com/office/powerpoint/2010/main" id="1" dur="indefinite" restart="never" nodeType="tmRoot"/>
+      </p:par>
+    </p:tnLst>
+  </p:timing>
+</p:sld>
+</file>
+
+<file path=ppt/slides/slide18.xml><?xml version="1.0" encoding="utf-8"?>
+<p:sld xmlns:a="http://schemas.openxmlformats.org/drawingml/2006/main" xmlns:r="http://schemas.openxmlformats.org/officeDocument/2006/relationships" xmlns:p="http://schemas.openxmlformats.org/presentationml/2006/main">
+  <p:cSld>
+    <p:spTree>
+      <p:nvGrpSpPr>
+        <p:cNvPr id="1" name=""/>
+        <p:cNvGrpSpPr/>
+        <p:nvPr/>
+      </p:nvGrpSpPr>
+      <p:grpSpPr>
+        <a:xfrm>
+          <a:off x="0" y="0"/>
+          <a:ext cx="0" cy="0"/>
+          <a:chOff x="0" y="0"/>
+          <a:chExt cx="0" cy="0"/>
+        </a:xfrm>
+      </p:grpSpPr>
+      <p:sp>
+        <p:nvSpPr>
+          <p:cNvPr id="2" name="Title 1"/>
+          <p:cNvSpPr>
+            <a:spLocks noGrp="1"/>
+          </p:cNvSpPr>
+          <p:nvPr>
+            <p:ph type="ctrTitle"/>
+          </p:nvPr>
+        </p:nvSpPr>
+        <p:spPr>
+          <a:xfrm>
+            <a:off x="685800" y="-701215"/>
+            <a:ext cx="7772400" cy="4267200"/>
+          </a:xfrm>
+        </p:spPr>
+        <p:txBody>
+          <a:bodyPr/>
+          <a:lstStyle/>
+          <a:p>
+            <a:r>
+              <a:rPr lang="en-US" sz="3500" u="sng" dirty="0" smtClean="0">
+                <a:solidFill>
+                  <a:schemeClr val="tx1">
+                    <a:lumMod val="65000"/>
+                    <a:lumOff val="35000"/>
+                  </a:schemeClr>
+                </a:solidFill>
+              </a:rPr>
+              <a:t>QUESTIONS?</a:t>
+            </a:r>
+            <a:endParaRPr lang="en-US" sz="3500" u="sng" dirty="0">
+              <a:solidFill>
+                <a:schemeClr val="tx1">
+                  <a:lumMod val="65000"/>
+                  <a:lumOff val="35000"/>
+                </a:schemeClr>
+              </a:solidFill>
+            </a:endParaRPr>
+          </a:p>
+        </p:txBody>
+      </p:sp>
+      <p:pic>
+        <p:nvPicPr>
+          <p:cNvPr id="5" name="Picture 4" descr="Logo.png"/>
+          <p:cNvPicPr>
+            <a:picLocks noChangeAspect="1"/>
+          </p:cNvPicPr>
+          <p:nvPr/>
+        </p:nvPicPr>
+        <p:blipFill>
+          <a:blip r:embed="rId2" cstate="print">
+            <a:extLst>
+              <a:ext uri="{28A0092B-C50C-407E-A947-70E740481C1C}">
+                <a14:useLocalDpi xmlns:a14="http://schemas.microsoft.com/office/drawing/2010/main" val="0"/>
+              </a:ext>
+            </a:extLst>
+          </a:blip>
+          <a:stretch>
+            <a:fillRect/>
+          </a:stretch>
+        </p:blipFill>
+        <p:spPr>
+          <a:xfrm>
+            <a:off x="3475205" y="6143475"/>
+            <a:ext cx="2432304" cy="573024"/>
+          </a:xfrm>
+          <a:prstGeom prst="rect">
+            <a:avLst/>
+          </a:prstGeom>
+        </p:spPr>
+      </p:pic>
+    </p:spTree>
+    <p:extLst>
+      <p:ext uri="{BB962C8B-B14F-4D97-AF65-F5344CB8AC3E}">
+        <p14:creationId xmlns:p14="http://schemas.microsoft.com/office/powerpoint/2010/main" val="4272725651"/>
       </p:ext>
     </p:extLst>
   </p:cSld>

</xml_diff>